<commit_message>
sensor presentation file updated
</commit_message>
<xml_diff>
--- a/session7/presentation/Raspberry pi Sensors.pptx
+++ b/session7/presentation/Raspberry pi Sensors.pptx
@@ -291,7 +291,7 @@
           <a:p>
             <a:fld id="{1139FA4A-C808-4981-8BA9-64217A6CCEA7}" type="datetimeFigureOut">
               <a:rPr lang="en-US" smtClean="0"/>
-              <a:t>9/8/2017</a:t>
+              <a:t>2/7/2018</a:t>
             </a:fld>
             <a:endParaRPr lang="en-US"/>
           </a:p>
@@ -459,7 +459,7 @@
           <a:p>
             <a:fld id="{1139FA4A-C808-4981-8BA9-64217A6CCEA7}" type="datetimeFigureOut">
               <a:rPr lang="en-US" smtClean="0"/>
-              <a:t>9/8/2017</a:t>
+              <a:t>2/7/2018</a:t>
             </a:fld>
             <a:endParaRPr lang="en-US"/>
           </a:p>
@@ -637,7 +637,7 @@
           <a:p>
             <a:fld id="{1139FA4A-C808-4981-8BA9-64217A6CCEA7}" type="datetimeFigureOut">
               <a:rPr lang="en-US" smtClean="0"/>
-              <a:t>9/8/2017</a:t>
+              <a:t>2/7/2018</a:t>
             </a:fld>
             <a:endParaRPr lang="en-US"/>
           </a:p>
@@ -805,7 +805,7 @@
           <a:p>
             <a:fld id="{1139FA4A-C808-4981-8BA9-64217A6CCEA7}" type="datetimeFigureOut">
               <a:rPr lang="en-US" smtClean="0"/>
-              <a:t>9/8/2017</a:t>
+              <a:t>2/7/2018</a:t>
             </a:fld>
             <a:endParaRPr lang="en-US"/>
           </a:p>
@@ -1050,7 +1050,7 @@
           <a:p>
             <a:fld id="{1139FA4A-C808-4981-8BA9-64217A6CCEA7}" type="datetimeFigureOut">
               <a:rPr lang="en-US" smtClean="0"/>
-              <a:t>9/8/2017</a:t>
+              <a:t>2/7/2018</a:t>
             </a:fld>
             <a:endParaRPr lang="en-US"/>
           </a:p>
@@ -1279,7 +1279,7 @@
           <a:p>
             <a:fld id="{1139FA4A-C808-4981-8BA9-64217A6CCEA7}" type="datetimeFigureOut">
               <a:rPr lang="en-US" smtClean="0"/>
-              <a:t>9/8/2017</a:t>
+              <a:t>2/7/2018</a:t>
             </a:fld>
             <a:endParaRPr lang="en-US"/>
           </a:p>
@@ -1643,7 +1643,7 @@
           <a:p>
             <a:fld id="{1139FA4A-C808-4981-8BA9-64217A6CCEA7}" type="datetimeFigureOut">
               <a:rPr lang="en-US" smtClean="0"/>
-              <a:t>9/8/2017</a:t>
+              <a:t>2/7/2018</a:t>
             </a:fld>
             <a:endParaRPr lang="en-US"/>
           </a:p>
@@ -1760,7 +1760,7 @@
           <a:p>
             <a:fld id="{1139FA4A-C808-4981-8BA9-64217A6CCEA7}" type="datetimeFigureOut">
               <a:rPr lang="en-US" smtClean="0"/>
-              <a:t>9/8/2017</a:t>
+              <a:t>2/7/2018</a:t>
             </a:fld>
             <a:endParaRPr lang="en-US"/>
           </a:p>
@@ -1855,7 +1855,7 @@
           <a:p>
             <a:fld id="{1139FA4A-C808-4981-8BA9-64217A6CCEA7}" type="datetimeFigureOut">
               <a:rPr lang="en-US" smtClean="0"/>
-              <a:t>9/8/2017</a:t>
+              <a:t>2/7/2018</a:t>
             </a:fld>
             <a:endParaRPr lang="en-US"/>
           </a:p>
@@ -2130,7 +2130,7 @@
           <a:p>
             <a:fld id="{1139FA4A-C808-4981-8BA9-64217A6CCEA7}" type="datetimeFigureOut">
               <a:rPr lang="en-US" smtClean="0"/>
-              <a:t>9/8/2017</a:t>
+              <a:t>2/7/2018</a:t>
             </a:fld>
             <a:endParaRPr lang="en-US"/>
           </a:p>
@@ -2382,7 +2382,7 @@
           <a:p>
             <a:fld id="{1139FA4A-C808-4981-8BA9-64217A6CCEA7}" type="datetimeFigureOut">
               <a:rPr lang="en-US" smtClean="0"/>
-              <a:t>9/8/2017</a:t>
+              <a:t>2/7/2018</a:t>
             </a:fld>
             <a:endParaRPr lang="en-US"/>
           </a:p>
@@ -2593,7 +2593,7 @@
           <a:p>
             <a:fld id="{1139FA4A-C808-4981-8BA9-64217A6CCEA7}" type="datetimeFigureOut">
               <a:rPr lang="en-US" smtClean="0"/>
-              <a:t>9/8/2017</a:t>
+              <a:t>2/7/2018</a:t>
             </a:fld>
             <a:endParaRPr lang="en-US"/>
           </a:p>
@@ -12981,7 +12981,7 @@
         <p:spPr>
           <a:xfrm>
             <a:off x="445476" y="857743"/>
-            <a:ext cx="11301047" cy="5632311"/>
+            <a:ext cx="11301047" cy="5324535"/>
           </a:xfrm>
           <a:prstGeom prst="rect">
             <a:avLst/>
@@ -13001,51 +13001,39 @@
                 <a:latin typeface="Consolas" panose="020B0609020204030204" pitchFamily="49" charset="0"/>
                 <a:cs typeface="Consolas" panose="020B0609020204030204" pitchFamily="49" charset="0"/>
               </a:rPr>
-              <a:t>import time</a:t>
-            </a:r>
-          </a:p>
-          <a:p>
-            <a:r>
-              <a:rPr lang="en-US" sz="2000" b="1" i="1" dirty="0">
-                <a:solidFill>
-                  <a:srgbClr val="0070C0"/>
-                </a:solidFill>
-                <a:latin typeface="Consolas" panose="020B0609020204030204" pitchFamily="49" charset="0"/>
-                <a:cs typeface="Consolas" panose="020B0609020204030204" pitchFamily="49" charset="0"/>
-              </a:rPr>
               <a:t>import </a:t>
             </a:r>
             <a:r>
-              <a:rPr lang="en-US" sz="2000" b="1" i="1" dirty="0" err="1">
-                <a:solidFill>
-                  <a:srgbClr val="0070C0"/>
-                </a:solidFill>
-                <a:latin typeface="Consolas" panose="020B0609020204030204" pitchFamily="49" charset="0"/>
-                <a:cs typeface="Consolas" panose="020B0609020204030204" pitchFamily="49" charset="0"/>
-              </a:rPr>
-              <a:t>Adafruit_GPIO.SPI</a:t>
-            </a:r>
-            <a:r>
-              <a:rPr lang="en-US" sz="2000" b="1" i="1" dirty="0">
-                <a:solidFill>
-                  <a:srgbClr val="0070C0"/>
-                </a:solidFill>
-                <a:latin typeface="Consolas" panose="020B0609020204030204" pitchFamily="49" charset="0"/>
-                <a:cs typeface="Consolas" panose="020B0609020204030204" pitchFamily="49" charset="0"/>
-              </a:rPr>
-              <a:t> as SPI</a:t>
-            </a:r>
-          </a:p>
-          <a:p>
-            <a:r>
-              <a:rPr lang="en-US" sz="2000" b="1" i="1" dirty="0">
-                <a:solidFill>
-                  <a:srgbClr val="0070C0"/>
-                </a:solidFill>
-                <a:latin typeface="Consolas" panose="020B0609020204030204" pitchFamily="49" charset="0"/>
-                <a:cs typeface="Consolas" panose="020B0609020204030204" pitchFamily="49" charset="0"/>
-              </a:rPr>
-              <a:t>import Adafruit_SSD1306</a:t>
+              <a:rPr lang="en-US" sz="2000" b="1" i="1" dirty="0" smtClean="0">
+                <a:solidFill>
+                  <a:srgbClr val="0070C0"/>
+                </a:solidFill>
+                <a:latin typeface="Consolas" panose="020B0609020204030204" pitchFamily="49" charset="0"/>
+                <a:cs typeface="Consolas" panose="020B0609020204030204" pitchFamily="49" charset="0"/>
+              </a:rPr>
+              <a:t>time</a:t>
+            </a:r>
+          </a:p>
+          <a:p>
+            <a:r>
+              <a:rPr lang="en-US" sz="2000" b="1" i="1" dirty="0" smtClean="0">
+                <a:solidFill>
+                  <a:srgbClr val="0070C0"/>
+                </a:solidFill>
+                <a:latin typeface="Consolas" panose="020B0609020204030204" pitchFamily="49" charset="0"/>
+                <a:cs typeface="Consolas" panose="020B0609020204030204" pitchFamily="49" charset="0"/>
+              </a:rPr>
+              <a:t>import </a:t>
+            </a:r>
+            <a:r>
+              <a:rPr lang="en-US" sz="2000" b="1" i="1" dirty="0">
+                <a:solidFill>
+                  <a:srgbClr val="0070C0"/>
+                </a:solidFill>
+                <a:latin typeface="Consolas" panose="020B0609020204030204" pitchFamily="49" charset="0"/>
+                <a:cs typeface="Consolas" panose="020B0609020204030204" pitchFamily="49" charset="0"/>
+              </a:rPr>
+              <a:t>Adafruit_SSD1306</a:t>
             </a:r>
           </a:p>
           <a:p>
@@ -14834,7 +14822,7 @@
         <p:spPr>
           <a:xfrm>
             <a:off x="445476" y="857743"/>
-            <a:ext cx="11301047" cy="5632311"/>
+            <a:ext cx="11301047" cy="5016758"/>
           </a:xfrm>
           <a:prstGeom prst="rect">
             <a:avLst/>
@@ -14942,32 +14930,22 @@
                 <a:latin typeface="Consolas" panose="020B0609020204030204" pitchFamily="49" charset="0"/>
                 <a:cs typeface="Consolas" panose="020B0609020204030204" pitchFamily="49" charset="0"/>
               </a:rPr>
-              <a:t>    draw = </a:t>
-            </a:r>
-            <a:r>
-              <a:rPr lang="en-US" sz="2000" b="1" i="1" dirty="0" err="1">
-                <a:solidFill>
-                  <a:srgbClr val="0070C0"/>
-                </a:solidFill>
-                <a:latin typeface="Consolas" panose="020B0609020204030204" pitchFamily="49" charset="0"/>
-                <a:cs typeface="Consolas" panose="020B0609020204030204" pitchFamily="49" charset="0"/>
-              </a:rPr>
-              <a:t>ImageDraw.Draw</a:t>
-            </a:r>
-            <a:r>
-              <a:rPr lang="en-US" sz="2000" b="1" i="1" dirty="0">
-                <a:solidFill>
-                  <a:srgbClr val="0070C0"/>
-                </a:solidFill>
-                <a:latin typeface="Consolas" panose="020B0609020204030204" pitchFamily="49" charset="0"/>
-                <a:cs typeface="Consolas" panose="020B0609020204030204" pitchFamily="49" charset="0"/>
-              </a:rPr>
-              <a:t>(image)</a:t>
-            </a:r>
-          </a:p>
-          <a:p>
-            <a:r>
-              <a:rPr lang="en-US" sz="2000" b="1" i="1" dirty="0">
+              <a:t>    draw = ImageDraw.Draw(image</a:t>
+            </a:r>
+            <a:r>
+              <a:rPr lang="en-US" sz="2000" b="1" i="1" dirty="0" smtClean="0">
+                <a:solidFill>
+                  <a:srgbClr val="0070C0"/>
+                </a:solidFill>
+                <a:latin typeface="Consolas" panose="020B0609020204030204" pitchFamily="49" charset="0"/>
+                <a:cs typeface="Consolas" panose="020B0609020204030204" pitchFamily="49" charset="0"/>
+              </a:rPr>
+              <a:t>)</a:t>
+            </a:r>
+          </a:p>
+          <a:p>
+            <a:r>
+              <a:rPr lang="en-US" sz="2000" b="1" i="1" dirty="0" smtClean="0">
                 <a:solidFill>
                   <a:srgbClr val="0070C0"/>
                 </a:solidFill>
@@ -14977,148 +14955,14 @@
               <a:t>    </a:t>
             </a:r>
             <a:r>
-              <a:rPr lang="en-US" sz="2000" b="1" i="1" dirty="0" err="1">
-                <a:solidFill>
-                  <a:srgbClr val="0070C0"/>
-                </a:solidFill>
-                <a:latin typeface="Consolas" panose="020B0609020204030204" pitchFamily="49" charset="0"/>
-                <a:cs typeface="Consolas" panose="020B0609020204030204" pitchFamily="49" charset="0"/>
-              </a:rPr>
-              <a:t>maxWidth</a:t>
-            </a:r>
-            <a:r>
-              <a:rPr lang="en-US" sz="2000" b="1" i="1" dirty="0">
-                <a:solidFill>
-                  <a:srgbClr val="0070C0"/>
-                </a:solidFill>
-                <a:latin typeface="Consolas" panose="020B0609020204030204" pitchFamily="49" charset="0"/>
-                <a:cs typeface="Consolas" panose="020B0609020204030204" pitchFamily="49" charset="0"/>
-              </a:rPr>
-              <a:t>, unused = </a:t>
-            </a:r>
-            <a:r>
-              <a:rPr lang="en-US" sz="2000" b="1" i="1" dirty="0" err="1">
-                <a:solidFill>
-                  <a:srgbClr val="0070C0"/>
-                </a:solidFill>
-                <a:latin typeface="Consolas" panose="020B0609020204030204" pitchFamily="49" charset="0"/>
-                <a:cs typeface="Consolas" panose="020B0609020204030204" pitchFamily="49" charset="0"/>
-              </a:rPr>
-              <a:t>draw.textsize</a:t>
-            </a:r>
-            <a:r>
-              <a:rPr lang="en-US" sz="2000" b="1" i="1" dirty="0">
-                <a:solidFill>
-                  <a:srgbClr val="0070C0"/>
-                </a:solidFill>
-                <a:latin typeface="Consolas" panose="020B0609020204030204" pitchFamily="49" charset="0"/>
-                <a:cs typeface="Consolas" panose="020B0609020204030204" pitchFamily="49" charset="0"/>
-              </a:rPr>
-              <a:t>(line1, font=</a:t>
-            </a:r>
-            <a:r>
-              <a:rPr lang="en-US" sz="2000" b="1" i="1" dirty="0" err="1">
-                <a:solidFill>
-                  <a:srgbClr val="0070C0"/>
-                </a:solidFill>
-                <a:latin typeface="Consolas" panose="020B0609020204030204" pitchFamily="49" charset="0"/>
-                <a:cs typeface="Consolas" panose="020B0609020204030204" pitchFamily="49" charset="0"/>
-              </a:rPr>
-              <a:t>largeFont</a:t>
-            </a:r>
-            <a:r>
-              <a:rPr lang="en-US" sz="2000" b="1" i="1" dirty="0">
-                <a:solidFill>
-                  <a:srgbClr val="0070C0"/>
-                </a:solidFill>
-                <a:latin typeface="Consolas" panose="020B0609020204030204" pitchFamily="49" charset="0"/>
-                <a:cs typeface="Consolas" panose="020B0609020204030204" pitchFamily="49" charset="0"/>
-              </a:rPr>
-              <a:t>)</a:t>
-            </a:r>
-          </a:p>
-          <a:p>
-            <a:r>
-              <a:rPr lang="en-US" sz="2000" b="1" i="1" dirty="0">
-                <a:solidFill>
-                  <a:srgbClr val="0070C0"/>
-                </a:solidFill>
-                <a:latin typeface="Consolas" panose="020B0609020204030204" pitchFamily="49" charset="0"/>
-                <a:cs typeface="Consolas" panose="020B0609020204030204" pitchFamily="49" charset="0"/>
-              </a:rPr>
-              <a:t>    #with canvas(</a:t>
-            </a:r>
-            <a:r>
-              <a:rPr lang="en-US" sz="2000" b="1" i="1" dirty="0" err="1">
-                <a:solidFill>
-                  <a:srgbClr val="0070C0"/>
-                </a:solidFill>
-                <a:latin typeface="Consolas" panose="020B0609020204030204" pitchFamily="49" charset="0"/>
-                <a:cs typeface="Consolas" panose="020B0609020204030204" pitchFamily="49" charset="0"/>
-              </a:rPr>
-              <a:t>deviccd</a:t>
-            </a:r>
-            <a:r>
-              <a:rPr lang="en-US" sz="2000" b="1" i="1" dirty="0">
-                <a:solidFill>
-                  <a:srgbClr val="0070C0"/>
-                </a:solidFill>
-                <a:latin typeface="Consolas" panose="020B0609020204030204" pitchFamily="49" charset="0"/>
-                <a:cs typeface="Consolas" panose="020B0609020204030204" pitchFamily="49" charset="0"/>
-              </a:rPr>
-              <a:t> e) as draw:</a:t>
-            </a:r>
-          </a:p>
-          <a:p>
-            <a:r>
-              <a:rPr lang="en-US" sz="2000" b="1" i="1" dirty="0">
-                <a:solidFill>
-                  <a:srgbClr val="0070C0"/>
-                </a:solidFill>
-                <a:latin typeface="Consolas" panose="020B0609020204030204" pitchFamily="49" charset="0"/>
-                <a:cs typeface="Consolas" panose="020B0609020204030204" pitchFamily="49" charset="0"/>
-              </a:rPr>
-              <a:t>    </a:t>
-            </a:r>
-            <a:r>
-              <a:rPr lang="en-US" sz="2000" b="1" i="1" dirty="0" err="1">
-                <a:solidFill>
-                  <a:srgbClr val="0070C0"/>
-                </a:solidFill>
-                <a:latin typeface="Consolas" panose="020B0609020204030204" pitchFamily="49" charset="0"/>
-                <a:cs typeface="Consolas" panose="020B0609020204030204" pitchFamily="49" charset="0"/>
-              </a:rPr>
-              <a:t>draw.text</a:t>
-            </a:r>
-            <a:r>
-              <a:rPr lang="en-US" sz="2000" b="1" i="1" dirty="0">
-                <a:solidFill>
-                  <a:srgbClr val="0070C0"/>
-                </a:solidFill>
-                <a:latin typeface="Consolas" panose="020B0609020204030204" pitchFamily="49" charset="0"/>
-                <a:cs typeface="Consolas" panose="020B0609020204030204" pitchFamily="49" charset="0"/>
-              </a:rPr>
-              <a:t>((10, 0),  line1, font=</a:t>
-            </a:r>
-            <a:r>
-              <a:rPr lang="en-US" sz="2000" b="1" i="1" dirty="0" err="1">
-                <a:solidFill>
-                  <a:srgbClr val="0070C0"/>
-                </a:solidFill>
-                <a:latin typeface="Consolas" panose="020B0609020204030204" pitchFamily="49" charset="0"/>
-                <a:cs typeface="Consolas" panose="020B0609020204030204" pitchFamily="49" charset="0"/>
-              </a:rPr>
-              <a:t>smallFont</a:t>
-            </a:r>
-            <a:r>
-              <a:rPr lang="en-US" sz="2000" b="1" i="1" dirty="0">
-                <a:solidFill>
-                  <a:srgbClr val="0070C0"/>
-                </a:solidFill>
-                <a:latin typeface="Consolas" panose="020B0609020204030204" pitchFamily="49" charset="0"/>
-                <a:cs typeface="Consolas" panose="020B0609020204030204" pitchFamily="49" charset="0"/>
-              </a:rPr>
-              <a:t>, fill=255)</a:t>
+              <a:rPr lang="en-US" sz="2000" b="1" i="1" dirty="0">
+                <a:solidFill>
+                  <a:srgbClr val="0070C0"/>
+                </a:solidFill>
+                <a:latin typeface="Consolas" panose="020B0609020204030204" pitchFamily="49" charset="0"/>
+                <a:cs typeface="Consolas" panose="020B0609020204030204" pitchFamily="49" charset="0"/>
+              </a:rPr>
+              <a:t>draw.text((10, 0),  line1, font=smallFont, fill=255)</a:t>
             </a:r>
           </a:p>
           <a:p>
@@ -15909,7 +15753,7 @@
         <p:spPr>
           <a:xfrm>
             <a:off x="445476" y="857743"/>
-            <a:ext cx="11301047" cy="5632311"/>
+            <a:ext cx="11301047" cy="5324535"/>
           </a:xfrm>
           <a:prstGeom prst="rect">
             <a:avLst/>
@@ -15929,51 +15773,39 @@
                 <a:latin typeface="Consolas" panose="020B0609020204030204" pitchFamily="49" charset="0"/>
                 <a:cs typeface="Consolas" panose="020B0609020204030204" pitchFamily="49" charset="0"/>
               </a:rPr>
-              <a:t>import time</a:t>
-            </a:r>
-          </a:p>
-          <a:p>
-            <a:r>
-              <a:rPr lang="en-US" sz="2000" b="1" i="1" dirty="0">
-                <a:solidFill>
-                  <a:srgbClr val="0070C0"/>
-                </a:solidFill>
-                <a:latin typeface="Consolas" panose="020B0609020204030204" pitchFamily="49" charset="0"/>
-                <a:cs typeface="Consolas" panose="020B0609020204030204" pitchFamily="49" charset="0"/>
-              </a:rPr>
               <a:t>import </a:t>
             </a:r>
             <a:r>
-              <a:rPr lang="en-US" sz="2000" b="1" i="1" dirty="0" err="1">
-                <a:solidFill>
-                  <a:srgbClr val="0070C0"/>
-                </a:solidFill>
-                <a:latin typeface="Consolas" panose="020B0609020204030204" pitchFamily="49" charset="0"/>
-                <a:cs typeface="Consolas" panose="020B0609020204030204" pitchFamily="49" charset="0"/>
-              </a:rPr>
-              <a:t>Adafruit_GPIO.SPI</a:t>
-            </a:r>
-            <a:r>
-              <a:rPr lang="en-US" sz="2000" b="1" i="1" dirty="0">
-                <a:solidFill>
-                  <a:srgbClr val="0070C0"/>
-                </a:solidFill>
-                <a:latin typeface="Consolas" panose="020B0609020204030204" pitchFamily="49" charset="0"/>
-                <a:cs typeface="Consolas" panose="020B0609020204030204" pitchFamily="49" charset="0"/>
-              </a:rPr>
-              <a:t> as SPI</a:t>
-            </a:r>
-          </a:p>
-          <a:p>
-            <a:r>
-              <a:rPr lang="en-US" sz="2000" b="1" i="1" dirty="0">
-                <a:solidFill>
-                  <a:srgbClr val="0070C0"/>
-                </a:solidFill>
-                <a:latin typeface="Consolas" panose="020B0609020204030204" pitchFamily="49" charset="0"/>
-                <a:cs typeface="Consolas" panose="020B0609020204030204" pitchFamily="49" charset="0"/>
-              </a:rPr>
-              <a:t>import Adafruit_SSD1306</a:t>
+              <a:rPr lang="en-US" sz="2000" b="1" i="1" dirty="0" smtClean="0">
+                <a:solidFill>
+                  <a:srgbClr val="0070C0"/>
+                </a:solidFill>
+                <a:latin typeface="Consolas" panose="020B0609020204030204" pitchFamily="49" charset="0"/>
+                <a:cs typeface="Consolas" panose="020B0609020204030204" pitchFamily="49" charset="0"/>
+              </a:rPr>
+              <a:t>time</a:t>
+            </a:r>
+          </a:p>
+          <a:p>
+            <a:r>
+              <a:rPr lang="en-US" sz="2000" b="1" i="1" dirty="0" smtClean="0">
+                <a:solidFill>
+                  <a:srgbClr val="0070C0"/>
+                </a:solidFill>
+                <a:latin typeface="Consolas" panose="020B0609020204030204" pitchFamily="49" charset="0"/>
+                <a:cs typeface="Consolas" panose="020B0609020204030204" pitchFamily="49" charset="0"/>
+              </a:rPr>
+              <a:t>import </a:t>
+            </a:r>
+            <a:r>
+              <a:rPr lang="en-US" sz="2000" b="1" i="1" dirty="0">
+                <a:solidFill>
+                  <a:srgbClr val="0070C0"/>
+                </a:solidFill>
+                <a:latin typeface="Consolas" panose="020B0609020204030204" pitchFamily="49" charset="0"/>
+                <a:cs typeface="Consolas" panose="020B0609020204030204" pitchFamily="49" charset="0"/>
+              </a:rPr>
+              <a:t>Adafruit_SSD1306</a:t>
             </a:r>
           </a:p>
           <a:p>
@@ -19096,7 +18928,7 @@
         <p:spPr>
           <a:xfrm>
             <a:off x="0" y="857743"/>
-            <a:ext cx="12192000" cy="5324535"/>
+            <a:ext cx="12192000" cy="5016758"/>
           </a:xfrm>
           <a:prstGeom prst="rect">
             <a:avLst/>
@@ -19128,51 +18960,39 @@
                 <a:latin typeface="Consolas" panose="020B0609020204030204" pitchFamily="49" charset="0"/>
                 <a:cs typeface="Consolas" panose="020B0609020204030204" pitchFamily="49" charset="0"/>
               </a:rPr>
-              <a:t>import time</a:t>
-            </a:r>
-          </a:p>
-          <a:p>
-            <a:r>
-              <a:rPr lang="en-US" sz="2000" b="1" i="1" dirty="0">
-                <a:solidFill>
-                  <a:srgbClr val="0070C0"/>
-                </a:solidFill>
-                <a:latin typeface="Consolas" panose="020B0609020204030204" pitchFamily="49" charset="0"/>
-                <a:cs typeface="Consolas" panose="020B0609020204030204" pitchFamily="49" charset="0"/>
-              </a:rPr>
               <a:t>import </a:t>
             </a:r>
             <a:r>
-              <a:rPr lang="en-US" sz="2000" b="1" i="1" dirty="0" err="1">
-                <a:solidFill>
-                  <a:srgbClr val="0070C0"/>
-                </a:solidFill>
-                <a:latin typeface="Consolas" panose="020B0609020204030204" pitchFamily="49" charset="0"/>
-                <a:cs typeface="Consolas" panose="020B0609020204030204" pitchFamily="49" charset="0"/>
-              </a:rPr>
-              <a:t>Adafruit_GPIO.SPI</a:t>
-            </a:r>
-            <a:r>
-              <a:rPr lang="en-US" sz="2000" b="1" i="1" dirty="0">
-                <a:solidFill>
-                  <a:srgbClr val="0070C0"/>
-                </a:solidFill>
-                <a:latin typeface="Consolas" panose="020B0609020204030204" pitchFamily="49" charset="0"/>
-                <a:cs typeface="Consolas" panose="020B0609020204030204" pitchFamily="49" charset="0"/>
-              </a:rPr>
-              <a:t> as SPI</a:t>
-            </a:r>
-          </a:p>
-          <a:p>
-            <a:r>
-              <a:rPr lang="en-US" sz="2000" b="1" i="1" dirty="0">
-                <a:solidFill>
-                  <a:srgbClr val="0070C0"/>
-                </a:solidFill>
-                <a:latin typeface="Consolas" panose="020B0609020204030204" pitchFamily="49" charset="0"/>
-                <a:cs typeface="Consolas" panose="020B0609020204030204" pitchFamily="49" charset="0"/>
-              </a:rPr>
-              <a:t>import Adafruit_SSD1306</a:t>
+              <a:rPr lang="en-US" sz="2000" b="1" i="1" dirty="0" smtClean="0">
+                <a:solidFill>
+                  <a:srgbClr val="0070C0"/>
+                </a:solidFill>
+                <a:latin typeface="Consolas" panose="020B0609020204030204" pitchFamily="49" charset="0"/>
+                <a:cs typeface="Consolas" panose="020B0609020204030204" pitchFamily="49" charset="0"/>
+              </a:rPr>
+              <a:t>time</a:t>
+            </a:r>
+          </a:p>
+          <a:p>
+            <a:r>
+              <a:rPr lang="en-US" sz="2000" b="1" i="1" dirty="0" smtClean="0">
+                <a:solidFill>
+                  <a:srgbClr val="0070C0"/>
+                </a:solidFill>
+                <a:latin typeface="Consolas" panose="020B0609020204030204" pitchFamily="49" charset="0"/>
+                <a:cs typeface="Consolas" panose="020B0609020204030204" pitchFamily="49" charset="0"/>
+              </a:rPr>
+              <a:t>import </a:t>
+            </a:r>
+            <a:r>
+              <a:rPr lang="en-US" sz="2000" b="1" i="1" dirty="0">
+                <a:solidFill>
+                  <a:srgbClr val="0070C0"/>
+                </a:solidFill>
+                <a:latin typeface="Consolas" panose="020B0609020204030204" pitchFamily="49" charset="0"/>
+                <a:cs typeface="Consolas" panose="020B0609020204030204" pitchFamily="49" charset="0"/>
+              </a:rPr>
+              <a:t>Adafruit_SSD1306</a:t>
             </a:r>
           </a:p>
           <a:p>

</xml_diff>